<commit_message>
Clean Up Repository Files
</commit_message>
<xml_diff>
--- a/Presentation/Vote Turnout Analysis.pptx
+++ b/Presentation/Vote Turnout Analysis.pptx
@@ -2,20 +2,20 @@
 <file path=ppt/presentation.xml><?xml version="1.0" encoding="utf-8"?>
 <p:presentation xmlns:a="http://schemas.openxmlformats.org/drawingml/2006/main" xmlns:r="http://schemas.openxmlformats.org/officeDocument/2006/relationships" xmlns:mc="http://schemas.openxmlformats.org/markup-compatibility/2006" xmlns:mv="urn:schemas-microsoft-com:mac:vml" xmlns:p="http://schemas.openxmlformats.org/presentationml/2006/main" xmlns:c="http://schemas.openxmlformats.org/drawingml/2006/chart" xmlns:dgm="http://schemas.openxmlformats.org/drawingml/2006/diagram" xmlns:o="urn:schemas-microsoft-com:office:office" xmlns:v="urn:schemas-microsoft-com:vml" xmlns:pvml="urn:schemas-microsoft-com:office:powerpoint" xmlns:com="http://schemas.openxmlformats.org/drawingml/2006/compatibility" xmlns:p14="http://schemas.microsoft.com/office/powerpoint/2010/main" xmlns:p15="http://schemas.microsoft.com/office/powerpoint/2012/main" xmlns:ahyp="http://schemas.microsoft.com/office/drawing/2018/hyperlinkcolor" autoCompressPictures="0" strictFirstAndLastChars="0" saveSubsetFonts="1">
   <p:sldMasterIdLst>
-    <p:sldMasterId id="2147483659" r:id="rId4"/>
+    <p:sldMasterId id="2147483659" r:id="rId5"/>
   </p:sldMasterIdLst>
   <p:notesMasterIdLst>
-    <p:notesMasterId r:id="rId5"/>
+    <p:notesMasterId r:id="rId6"/>
   </p:notesMasterIdLst>
   <p:sldIdLst>
-    <p:sldId id="256" r:id="rId6"/>
-    <p:sldId id="257" r:id="rId7"/>
-    <p:sldId id="258" r:id="rId8"/>
-    <p:sldId id="259" r:id="rId9"/>
-    <p:sldId id="260" r:id="rId10"/>
-    <p:sldId id="261" r:id="rId11"/>
-    <p:sldId id="262" r:id="rId12"/>
-    <p:sldId id="263" r:id="rId13"/>
+    <p:sldId id="256" r:id="rId7"/>
+    <p:sldId id="257" r:id="rId8"/>
+    <p:sldId id="258" r:id="rId9"/>
+    <p:sldId id="259" r:id="rId10"/>
+    <p:sldId id="260" r:id="rId11"/>
+    <p:sldId id="261" r:id="rId12"/>
+    <p:sldId id="262" r:id="rId13"/>
+    <p:sldId id="263" r:id="rId14"/>
   </p:sldIdLst>
   <p:sldSz cy="5143500" cx="9144000"/>
   <p:notesSz cx="6858000" cy="9144000"/>
@@ -265,6 +265,30 @@
     </p:ext>
   </p:extLst>
 </p:presentation>
+</file>
+
+<file path=ppt/commentAuthors.xml><?xml version="1.0" encoding="utf-8"?>
+<p:cmAuthorLst xmlns:a="http://schemas.openxmlformats.org/drawingml/2006/main" xmlns:r="http://schemas.openxmlformats.org/officeDocument/2006/relationships" xmlns:mc="http://schemas.openxmlformats.org/markup-compatibility/2006" xmlns:mv="urn:schemas-microsoft-com:mac:vml" xmlns:p="http://schemas.openxmlformats.org/presentationml/2006/main" xmlns:c="http://schemas.openxmlformats.org/drawingml/2006/chart" xmlns:dgm="http://schemas.openxmlformats.org/drawingml/2006/diagram" xmlns:o="urn:schemas-microsoft-com:office:office" xmlns:v="urn:schemas-microsoft-com:vml" xmlns:pvml="urn:schemas-microsoft-com:office:powerpoint" xmlns:com="http://schemas.openxmlformats.org/drawingml/2006/compatibility" xmlns:p14="http://schemas.microsoft.com/office/powerpoint/2010/main" xmlns:p15="http://schemas.microsoft.com/office/powerpoint/2012/main" xmlns:ahyp="http://schemas.microsoft.com/office/drawing/2018/hyperlinkcolor">
+  <p:cmAuthor clrIdx="0" id="0" initials="" lastIdx="2" name="Natalia Kuznetsova"/>
+</p:cmAuthorLst>
+</file>
+
+<file path=ppt/comments/comment1.xml><?xml version="1.0" encoding="utf-8"?>
+<p:cmLst xmlns:a="http://schemas.openxmlformats.org/drawingml/2006/main" xmlns:r="http://schemas.openxmlformats.org/officeDocument/2006/relationships" xmlns:mc="http://schemas.openxmlformats.org/markup-compatibility/2006" xmlns:mv="urn:schemas-microsoft-com:mac:vml" xmlns:p="http://schemas.openxmlformats.org/presentationml/2006/main" xmlns:c="http://schemas.openxmlformats.org/drawingml/2006/chart" xmlns:dgm="http://schemas.openxmlformats.org/drawingml/2006/diagram" xmlns:o="urn:schemas-microsoft-com:office:office" xmlns:v="urn:schemas-microsoft-com:vml" xmlns:pvml="urn:schemas-microsoft-com:office:powerpoint" xmlns:com="http://schemas.openxmlformats.org/drawingml/2006/compatibility" xmlns:p14="http://schemas.microsoft.com/office/powerpoint/2010/main" xmlns:p15="http://schemas.microsoft.com/office/powerpoint/2012/main" xmlns:ahyp="http://schemas.microsoft.com/office/drawing/2018/hyperlinkcolor">
+  <p:cm authorId="0" idx="1" dt="2020-11-01T20:20:43.423">
+    <p:pos x="274" y="612"/>
+    <p:text>This looks like too big paragraph to read. I suggest breaking it into bullets.</p:text>
+  </p:cm>
+</p:cmLst>
+</file>
+
+<file path=ppt/comments/comment2.xml><?xml version="1.0" encoding="utf-8"?>
+<p:cmLst xmlns:a="http://schemas.openxmlformats.org/drawingml/2006/main" xmlns:r="http://schemas.openxmlformats.org/officeDocument/2006/relationships" xmlns:mc="http://schemas.openxmlformats.org/markup-compatibility/2006" xmlns:mv="urn:schemas-microsoft-com:mac:vml" xmlns:p="http://schemas.openxmlformats.org/presentationml/2006/main" xmlns:c="http://schemas.openxmlformats.org/drawingml/2006/chart" xmlns:dgm="http://schemas.openxmlformats.org/drawingml/2006/diagram" xmlns:o="urn:schemas-microsoft-com:office:office" xmlns:v="urn:schemas-microsoft-com:vml" xmlns:pvml="urn:schemas-microsoft-com:office:powerpoint" xmlns:com="http://schemas.openxmlformats.org/drawingml/2006/compatibility" xmlns:p14="http://schemas.microsoft.com/office/powerpoint/2010/main" xmlns:p15="http://schemas.microsoft.com/office/powerpoint/2012/main" xmlns:ahyp="http://schemas.microsoft.com/office/drawing/2018/hyperlinkcolor">
+  <p:cm authorId="0" idx="2" dt="2020-11-01T19:47:50.343">
+    <p:pos x="196" y="606"/>
+    <p:text>I would delete it.</p:text>
+  </p:cm>
+</p:cmLst>
 </file>
 
 <file path=ppt/notesMasters/notesMaster1.xml><?xml version="1.0" encoding="utf-8"?>
@@ -1391,7 +1415,7 @@
   <p:cSld>
     <p:spTree>
       <p:nvGrpSpPr>
-        <p:cNvPr id="103" name="Shape 103"/>
+        <p:cNvPr id="105" name="Shape 105"/>
         <p:cNvGrpSpPr/>
         <p:nvPr/>
       </p:nvGrpSpPr>
@@ -1405,7 +1429,7 @@
       </p:grpSpPr>
       <p:sp>
         <p:nvSpPr>
-          <p:cNvPr id="104" name="Google Shape;104;ga6405afa7a_0_381:notes"/>
+          <p:cNvPr id="106" name="Google Shape;106;ga6405afa7a_0_381:notes"/>
           <p:cNvSpPr/>
           <p:nvPr>
             <p:ph idx="2" type="sldImg"/>
@@ -1440,7 +1464,7 @@
       </p:sp>
       <p:sp>
         <p:nvSpPr>
-          <p:cNvPr id="105" name="Google Shape;105;ga6405afa7a_0_381:notes"/>
+          <p:cNvPr id="107" name="Google Shape;107;ga6405afa7a_0_381:notes"/>
           <p:cNvSpPr txBox="1"/>
           <p:nvPr>
             <p:ph idx="1" type="body"/>
@@ -6370,7 +6394,15 @@
                   <a:srgbClr val="0000FF"/>
                 </a:solidFill>
               </a:rPr>
-              <a:t>45 % of the Ameri</a:t>
+              <a:t>45</a:t>
+            </a:r>
+            <a:r>
+              <a:rPr b="1" lang="en">
+                <a:solidFill>
+                  <a:srgbClr val="0000FF"/>
+                </a:solidFill>
+              </a:rPr>
+              <a:t> % of the Ameri</a:t>
             </a:r>
             <a:r>
               <a:rPr b="1" lang="en">
@@ -6423,7 +6455,7 @@
         </p:nvSpPr>
         <p:spPr>
           <a:xfrm>
-            <a:off x="311700" y="445025"/>
+            <a:off x="311700" y="281750"/>
             <a:ext cx="8520600" cy="572700"/>
           </a:xfrm>
           <a:prstGeom prst="rect">
@@ -6463,8 +6495,8 @@
         </p:nvSpPr>
         <p:spPr>
           <a:xfrm>
-            <a:off x="410750" y="1152475"/>
-            <a:ext cx="4287000" cy="3416400"/>
+            <a:off x="436525" y="972000"/>
+            <a:ext cx="7994100" cy="1979100"/>
           </a:xfrm>
           <a:prstGeom prst="rect">
             <a:avLst/>
@@ -6476,17 +6508,21 @@
           </a:bodyPr>
           <a:lstStyle/>
           <a:p>
-            <a:pPr indent="0" lvl="0" marL="0" rtl="0" algn="l">
-              <a:spcBef>
-                <a:spcPts val="0"/>
-              </a:spcBef>
-              <a:spcAft>
-                <a:spcPts val="0"/>
-              </a:spcAft>
-              <a:buNone/>
+            <a:pPr indent="-330200" lvl="0" marL="457200" rtl="0" algn="l">
+              <a:spcBef>
+                <a:spcPts val="0"/>
+              </a:spcBef>
+              <a:spcAft>
+                <a:spcPts val="0"/>
+              </a:spcAft>
+              <a:buClr>
+                <a:srgbClr val="000000"/>
+              </a:buClr>
+              <a:buSzPts val="1600"/>
+              <a:buChar char="●"/>
             </a:pPr>
             <a:r>
-              <a:rPr lang="en" sz="1200">
+              <a:rPr lang="en" sz="1600">
                 <a:solidFill>
                   <a:srgbClr val="000000"/>
                 </a:solidFill>
@@ -6497,7 +6533,7 @@
               <a:t>The reasons our team chose the topic of “Voter Turnout Analysis” was because we think this is something interesting concerning the </a:t>
             </a:r>
             <a:r>
-              <a:rPr lang="en" sz="1200">
+              <a:rPr lang="en" sz="1600">
                 <a:solidFill>
                   <a:srgbClr val="000000"/>
                 </a:solidFill>
@@ -6508,7 +6544,7 @@
               <a:t>US</a:t>
             </a:r>
             <a:r>
-              <a:rPr lang="en" sz="1200">
+              <a:rPr lang="en" sz="1600">
                 <a:solidFill>
                   <a:srgbClr val="000000"/>
                 </a:solidFill>
@@ -6516,9 +6552,99 @@
                   <a:srgbClr val="FFFFFF"/>
                 </a:highlight>
               </a:rPr>
-              <a:t> elections. When discussing this topic with the team we asked ourselves how high the voter Turnout in the elections is and why has this number not been able to change in a long time. Knowing that the US has had a 45% voter Turnout, we decided to analyze different areas of this data to find out why this is a problem.</a:t>
+              <a:t> elections. </a:t>
             </a:r>
-            <a:endParaRPr sz="1200">
+            <a:endParaRPr sz="1600">
+              <a:solidFill>
+                <a:srgbClr val="000000"/>
+              </a:solidFill>
+              <a:highlight>
+                <a:srgbClr val="FFFFFF"/>
+              </a:highlight>
+            </a:endParaRPr>
+          </a:p>
+          <a:p>
+            <a:pPr indent="-330200" lvl="0" marL="457200" rtl="0" algn="l">
+              <a:spcBef>
+                <a:spcPts val="0"/>
+              </a:spcBef>
+              <a:spcAft>
+                <a:spcPts val="0"/>
+              </a:spcAft>
+              <a:buClr>
+                <a:srgbClr val="000000"/>
+              </a:buClr>
+              <a:buSzPts val="1600"/>
+              <a:buChar char="●"/>
+            </a:pPr>
+            <a:r>
+              <a:rPr lang="en" sz="1600">
+                <a:solidFill>
+                  <a:srgbClr val="000000"/>
+                </a:solidFill>
+                <a:highlight>
+                  <a:srgbClr val="FFFFFF"/>
+                </a:highlight>
+              </a:rPr>
+              <a:t>When discussing this topic with the team we asked ourselves how high the voter Turnout in the elections is and why has this number not been able to change in a long time. </a:t>
+            </a:r>
+            <a:endParaRPr sz="1600">
+              <a:solidFill>
+                <a:srgbClr val="000000"/>
+              </a:solidFill>
+              <a:highlight>
+                <a:srgbClr val="FFFFFF"/>
+              </a:highlight>
+            </a:endParaRPr>
+          </a:p>
+          <a:p>
+            <a:pPr indent="-330200" lvl="0" marL="457200" rtl="0" algn="l">
+              <a:spcBef>
+                <a:spcPts val="0"/>
+              </a:spcBef>
+              <a:spcAft>
+                <a:spcPts val="0"/>
+              </a:spcAft>
+              <a:buClr>
+                <a:srgbClr val="000000"/>
+              </a:buClr>
+              <a:buSzPts val="1600"/>
+              <a:buChar char="●"/>
+            </a:pPr>
+            <a:r>
+              <a:rPr lang="en" sz="1600">
+                <a:solidFill>
+                  <a:srgbClr val="000000"/>
+                </a:solidFill>
+                <a:highlight>
+                  <a:srgbClr val="FFFFFF"/>
+                </a:highlight>
+              </a:rPr>
+              <a:t>Knowing that the US has had a 55% voter Turnout, we decided to analyze different areas of this data to find out why this is a </a:t>
+            </a:r>
+            <a:r>
+              <a:rPr lang="en" sz="1600">
+                <a:solidFill>
+                  <a:srgbClr val="000000"/>
+                </a:solidFill>
+                <a:highlight>
+                  <a:srgbClr val="FFFFFF"/>
+                </a:highlight>
+              </a:rPr>
+              <a:t>problem</a:t>
+            </a:r>
+            <a:r>
+              <a:rPr lang="en" sz="1600">
+                <a:solidFill>
+                  <a:srgbClr val="000000"/>
+                </a:solidFill>
+                <a:highlight>
+                  <a:srgbClr val="FFFFFF"/>
+                </a:highlight>
+              </a:rPr>
+              <a:t>.</a:t>
+            </a:r>
+            <a:endParaRPr sz="1600">
               <a:solidFill>
                 <a:srgbClr val="000000"/>
               </a:solidFill>
@@ -6588,7 +6714,7 @@
           <p:nvPr/>
         </p:nvPicPr>
         <p:blipFill>
-          <a:blip r:embed="rId3">
+          <a:blip r:embed="rId4">
             <a:alphaModFix/>
           </a:blip>
           <a:stretch>
@@ -6597,7 +6723,7 @@
         </p:blipFill>
         <p:spPr>
           <a:xfrm>
-            <a:off x="5302950" y="1099400"/>
+            <a:off x="5526375" y="3208925"/>
             <a:ext cx="2792000" cy="1857950"/>
           </a:xfrm>
           <a:prstGeom prst="rect">
@@ -6616,7 +6742,7 @@
           <p:nvPr/>
         </p:nvPicPr>
         <p:blipFill>
-          <a:blip r:embed="rId4">
+          <a:blip r:embed="rId5">
             <a:alphaModFix/>
           </a:blip>
           <a:stretch>
@@ -6625,7 +6751,7 @@
         </p:blipFill>
         <p:spPr>
           <a:xfrm>
-            <a:off x="5302950" y="3286625"/>
+            <a:off x="834075" y="3472575"/>
             <a:ext cx="3048000" cy="1504950"/>
           </a:xfrm>
           <a:prstGeom prst="rect">
@@ -7033,7 +7159,7 @@
         </p:nvSpPr>
         <p:spPr>
           <a:xfrm>
-            <a:off x="311700" y="445025"/>
+            <a:off x="311700" y="365650"/>
             <a:ext cx="8520600" cy="572700"/>
           </a:xfrm>
           <a:prstGeom prst="rect">
@@ -7073,8 +7199,8 @@
         </p:nvSpPr>
         <p:spPr>
           <a:xfrm>
-            <a:off x="311700" y="1117500"/>
-            <a:ext cx="8520600" cy="3416400"/>
+            <a:off x="311700" y="898875"/>
+            <a:ext cx="8520600" cy="3930000"/>
           </a:xfrm>
           <a:prstGeom prst="rect">
             <a:avLst/>
@@ -7132,6 +7258,27 @@
               <a:buNone/>
             </a:pPr>
             <a:r>
+              <a:rPr lang="en" u="sng">
+                <a:solidFill>
+                  <a:schemeClr val="hlink"/>
+                </a:solidFill>
+                <a:hlinkClick r:id="rId3"/>
+              </a:rPr>
+              <a:t>www.census.gov</a:t>
+            </a:r>
+            <a:endParaRPr/>
+          </a:p>
+          <a:p>
+            <a:pPr indent="0" lvl="0" marL="0" rtl="0" algn="l">
+              <a:spcBef>
+                <a:spcPts val="1600"/>
+              </a:spcBef>
+              <a:spcAft>
+                <a:spcPts val="0"/>
+              </a:spcAft>
+              <a:buNone/>
+            </a:pPr>
+            <a:r>
               <a:rPr lang="en"/>
               <a:t>Election Prediction Indicators from MIT</a:t>
             </a:r>
@@ -7152,7 +7299,7 @@
                 <a:solidFill>
                   <a:schemeClr val="hlink"/>
                 </a:solidFill>
-                <a:hlinkClick r:id="rId3"/>
+                <a:hlinkClick r:id="rId4"/>
               </a:rPr>
               <a:t>https://electionlab.mit.edu/data</a:t>
             </a:r>
@@ -7189,7 +7336,7 @@
                 <a:solidFill>
                   <a:schemeClr val="hlink"/>
                 </a:solidFill>
-                <a:hlinkClick r:id="rId4"/>
+                <a:hlinkClick r:id="rId5"/>
               </a:rPr>
               <a:t>http://www.electproject.org/home/voter-turnout/voter-turnout-data</a:t>
             </a:r>
@@ -7208,7 +7355,7 @@
           <p:nvPr/>
         </p:nvPicPr>
         <p:blipFill>
-          <a:blip r:embed="rId5">
+          <a:blip r:embed="rId6">
             <a:alphaModFix/>
           </a:blip>
           <a:stretch>
@@ -7528,15 +7675,7 @@
             </a:pPr>
             <a:r>
               <a:rPr lang="en"/>
-              <a:t>We will analyze data on the demographics of voters in the past three </a:t>
-            </a:r>
-            <a:r>
-              <a:rPr lang="en"/>
-              <a:t>presidential</a:t>
-            </a:r>
-            <a:r>
-              <a:rPr lang="en"/>
-              <a:t> elections in the United States. </a:t>
+              <a:t>We will analyze data on the demographics of voters in the past six Federal elections in the United States. </a:t>
             </a:r>
             <a:endParaRPr/>
           </a:p>
@@ -7560,7 +7699,11 @@
             </a:r>
             <a:r>
               <a:rPr lang="en"/>
-              <a:t> the results without a bias opinion of the data we found. </a:t>
+              <a:t> the results without a bias opinion of the data we found</a:t>
+            </a:r>
+            <a:r>
+              <a:rPr lang="en"/>
+              <a:t>. </a:t>
             </a:r>
             <a:endParaRPr/>
           </a:p>
@@ -7674,7 +7817,7 @@
         <p:spPr>
           <a:xfrm>
             <a:off x="311700" y="963375"/>
-            <a:ext cx="8520600" cy="3864900"/>
+            <a:ext cx="4816800" cy="3864900"/>
           </a:xfrm>
           <a:prstGeom prst="rect">
             <a:avLst/>
@@ -7686,18 +7829,86 @@
           </a:bodyPr>
           <a:lstStyle/>
           <a:p>
-            <a:pPr indent="0" lvl="0" marL="0" rtl="0" algn="l">
-              <a:spcBef>
-                <a:spcPts val="0"/>
-              </a:spcBef>
-              <a:spcAft>
-                <a:spcPts val="0"/>
-              </a:spcAft>
-              <a:buNone/>
+            <a:pPr indent="-228600" lvl="0" marL="342900" rtl="0" algn="l">
+              <a:spcBef>
+                <a:spcPts val="0"/>
+              </a:spcBef>
+              <a:spcAft>
+                <a:spcPts val="0"/>
+              </a:spcAft>
+              <a:buSzPts val="1800"/>
+              <a:buChar char="★"/>
             </a:pPr>
             <a:r>
               <a:rPr lang="en"/>
-              <a:t>The graph below illustrates the distribution of turnout rate in the past six elections - from 2008 to 2018. The majority of states have approximately 0.6 turnout.</a:t>
+              <a:t>This histogram illustrates the per State distribution of turnout rate in the past six elections - from 2008 to 2018.</a:t>
+            </a:r>
+            <a:endParaRPr/>
+          </a:p>
+          <a:p>
+            <a:pPr indent="-228600" lvl="0" marL="342900" rtl="0" algn="l">
+              <a:spcBef>
+                <a:spcPts val="0"/>
+              </a:spcBef>
+              <a:spcAft>
+                <a:spcPts val="0"/>
+              </a:spcAft>
+              <a:buSzPts val="1800"/>
+              <a:buChar char="★"/>
+            </a:pPr>
+            <a:r>
+              <a:rPr lang="en"/>
+              <a:t>The majority of states have approximately 0.6 turnout.</a:t>
+            </a:r>
+            <a:endParaRPr/>
+          </a:p>
+          <a:p>
+            <a:pPr indent="-228600" lvl="0" marL="342900" rtl="0" algn="l">
+              <a:spcBef>
+                <a:spcPts val="0"/>
+              </a:spcBef>
+              <a:spcAft>
+                <a:spcPts val="0"/>
+              </a:spcAft>
+              <a:buSzPts val="1800"/>
+              <a:buChar char="★"/>
+            </a:pPr>
+            <a:r>
+              <a:rPr lang="en"/>
+              <a:t>The turnout ranges from 0.28 to 0.78 </a:t>
+            </a:r>
+            <a:endParaRPr/>
+          </a:p>
+          <a:p>
+            <a:pPr indent="-228600" lvl="0" marL="342900" rtl="0" algn="l">
+              <a:spcBef>
+                <a:spcPts val="0"/>
+              </a:spcBef>
+              <a:spcAft>
+                <a:spcPts val="0"/>
+              </a:spcAft>
+              <a:buSzPts val="1800"/>
+              <a:buChar char="★"/>
+            </a:pPr>
+            <a:r>
+              <a:rPr lang="en"/>
+              <a:t>Our analysis will show the importance of factors contributing to this wide range in turnout</a:t>
+            </a:r>
+            <a:endParaRPr/>
+          </a:p>
+          <a:p>
+            <a:pPr indent="0" lvl="0" marL="0" rtl="0" algn="l">
+              <a:spcBef>
+                <a:spcPts val="1600"/>
+              </a:spcBef>
+              <a:spcAft>
+                <a:spcPts val="0"/>
+              </a:spcAft>
+              <a:buNone/>
+            </a:pPr>
+            <a:r>
+              <a:rPr lang="en"/>
+              <a:t>									</a:t>
             </a:r>
             <a:endParaRPr/>
           </a:p>
@@ -7749,7 +7960,7 @@
         </p:blipFill>
         <p:spPr>
           <a:xfrm>
-            <a:off x="873600" y="2571750"/>
+            <a:off x="5567675" y="1498125"/>
             <a:ext cx="2435800" cy="1603550"/>
           </a:xfrm>
           <a:prstGeom prst="rect">
@@ -7761,6 +7972,94 @@
           </a:ln>
         </p:spPr>
       </p:pic>
+      <p:sp>
+        <p:nvSpPr>
+          <p:cNvPr id="103" name="Google Shape;103;p19"/>
+          <p:cNvSpPr txBox="1"/>
+          <p:nvPr/>
+        </p:nvSpPr>
+        <p:spPr>
+          <a:xfrm rot="-5400000">
+            <a:off x="4464350" y="2033075"/>
+            <a:ext cx="1872600" cy="264600"/>
+          </a:xfrm>
+          <a:prstGeom prst="rect">
+            <a:avLst/>
+          </a:prstGeom>
+          <a:noFill/>
+          <a:ln>
+            <a:noFill/>
+          </a:ln>
+        </p:spPr>
+        <p:txBody>
+          <a:bodyPr anchorCtr="0" anchor="t" bIns="91425" lIns="91425" spcFirstLastPara="1" rIns="91425" wrap="square" tIns="91425">
+            <a:noAutofit/>
+          </a:bodyPr>
+          <a:lstStyle/>
+          <a:p>
+            <a:pPr indent="0" lvl="0" marL="0" rtl="0" algn="l">
+              <a:spcBef>
+                <a:spcPts val="0"/>
+              </a:spcBef>
+              <a:spcAft>
+                <a:spcPts val="0"/>
+              </a:spcAft>
+              <a:buNone/>
+            </a:pPr>
+            <a:r>
+              <a:rPr lang="en" sz="900"/>
+              <a:t>Count by year-state tuple</a:t>
+            </a:r>
+            <a:endParaRPr sz="900"/>
+          </a:p>
+        </p:txBody>
+      </p:sp>
+      <p:sp>
+        <p:nvSpPr>
+          <p:cNvPr id="104" name="Google Shape;104;p19"/>
+          <p:cNvSpPr txBox="1"/>
+          <p:nvPr/>
+        </p:nvSpPr>
+        <p:spPr>
+          <a:xfrm>
+            <a:off x="5567675" y="3161025"/>
+            <a:ext cx="2841600" cy="359400"/>
+          </a:xfrm>
+          <a:prstGeom prst="rect">
+            <a:avLst/>
+          </a:prstGeom>
+          <a:noFill/>
+          <a:ln>
+            <a:noFill/>
+          </a:ln>
+        </p:spPr>
+        <p:txBody>
+          <a:bodyPr anchorCtr="0" anchor="t" bIns="91425" lIns="91425" spcFirstLastPara="1" rIns="91425" wrap="square" tIns="91425">
+            <a:noAutofit/>
+          </a:bodyPr>
+          <a:lstStyle/>
+          <a:p>
+            <a:pPr indent="0" lvl="0" marL="0" rtl="0" algn="l">
+              <a:spcBef>
+                <a:spcPts val="0"/>
+              </a:spcBef>
+              <a:spcAft>
+                <a:spcPts val="0"/>
+              </a:spcAft>
+              <a:buNone/>
+            </a:pPr>
+            <a:r>
+              <a:rPr lang="en" sz="900"/>
+              <a:t>T</a:t>
+            </a:r>
+            <a:r>
+              <a:rPr lang="en" sz="900"/>
+              <a:t>urnout rate of “Voting Eligible Population” (VEP)</a:t>
+            </a:r>
+            <a:endParaRPr sz="900"/>
+          </a:p>
+        </p:txBody>
+      </p:sp>
     </p:spTree>
   </p:cSld>
   <p:clrMapOvr>
@@ -7774,7 +8073,7 @@
   <p:cSld>
     <p:spTree>
       <p:nvGrpSpPr>
-        <p:cNvPr id="106" name="Shape 106"/>
+        <p:cNvPr id="108" name="Shape 108"/>
         <p:cNvGrpSpPr/>
         <p:nvPr/>
       </p:nvGrpSpPr>
@@ -7788,7 +8087,7 @@
       </p:grpSpPr>
       <p:sp>
         <p:nvSpPr>
-          <p:cNvPr id="107" name="Google Shape;107;p20"/>
+          <p:cNvPr id="109" name="Google Shape;109;p20"/>
           <p:cNvSpPr txBox="1"/>
           <p:nvPr>
             <p:ph type="title"/>
@@ -7865,7 +8164,7 @@
       </p:sp>
       <p:sp>
         <p:nvSpPr>
-          <p:cNvPr id="108" name="Google Shape;108;p20"/>
+          <p:cNvPr id="110" name="Google Shape;110;p20"/>
           <p:cNvSpPr txBox="1"/>
           <p:nvPr>
             <p:ph idx="1" type="body"/>
@@ -7874,7 +8173,7 @@
         <p:spPr>
           <a:xfrm>
             <a:off x="311700" y="1152475"/>
-            <a:ext cx="4260300" cy="3416400"/>
+            <a:ext cx="8133900" cy="833100"/>
           </a:xfrm>
           <a:prstGeom prst="rect">
             <a:avLst/>
@@ -7956,7 +8255,7 @@
       </p:sp>
       <p:pic>
         <p:nvPicPr>
-          <p:cNvPr id="109" name="Google Shape;109;p20"/>
+          <p:cNvPr id="111" name="Google Shape;111;p20"/>
           <p:cNvPicPr preferRelativeResize="0"/>
           <p:nvPr/>
         </p:nvPicPr>
@@ -7984,7 +8283,7 @@
       </p:pic>
       <p:pic>
         <p:nvPicPr>
-          <p:cNvPr id="110" name="Google Shape;110;p20"/>
+          <p:cNvPr id="112" name="Google Shape;112;p20"/>
           <p:cNvPicPr preferRelativeResize="0"/>
           <p:nvPr/>
         </p:nvPicPr>
@@ -8012,7 +8311,7 @@
       </p:pic>
       <p:pic>
         <p:nvPicPr>
-          <p:cNvPr id="111" name="Google Shape;111;p20"/>
+          <p:cNvPr id="113" name="Google Shape;113;p20"/>
           <p:cNvPicPr preferRelativeResize="0"/>
           <p:nvPr/>
         </p:nvPicPr>

</xml_diff>